<commit_message>
Upgraded to run in VS 2010
</commit_message>
<xml_diff>
--- a/docs/Patterns.pptx
+++ b/docs/Patterns.pptx
@@ -364,7 +364,7 @@
               <a:pPr>
                 <a:defRPr/>
               </a:pPr>
-              <a:t>5/13/2009</a:t>
+              <a:t>2/5/2013</a:t>
             </a:fld>
             <a:endParaRPr lang="en-US"/>
           </a:p>
@@ -556,7 +556,7 @@
               <a:pPr>
                 <a:defRPr/>
               </a:pPr>
-              <a:t>5/13/2009</a:t>
+              <a:t>2/5/2013</a:t>
             </a:fld>
             <a:endParaRPr lang="en-US"/>
           </a:p>
@@ -758,7 +758,7 @@
               <a:pPr>
                 <a:defRPr/>
               </a:pPr>
-              <a:t>5/13/2009</a:t>
+              <a:t>2/5/2013</a:t>
             </a:fld>
             <a:endParaRPr lang="en-US"/>
           </a:p>
@@ -950,7 +950,7 @@
               <a:pPr>
                 <a:defRPr/>
               </a:pPr>
-              <a:t>5/13/2009</a:t>
+              <a:t>2/5/2013</a:t>
             </a:fld>
             <a:endParaRPr lang="en-US"/>
           </a:p>
@@ -1218,7 +1218,7 @@
               <a:pPr>
                 <a:defRPr/>
               </a:pPr>
-              <a:t>5/13/2009</a:t>
+              <a:t>2/5/2013</a:t>
             </a:fld>
             <a:endParaRPr lang="en-US"/>
           </a:p>
@@ -1528,7 +1528,7 @@
               <a:pPr>
                 <a:defRPr/>
               </a:pPr>
-              <a:t>5/13/2009</a:t>
+              <a:t>2/5/2013</a:t>
             </a:fld>
             <a:endParaRPr lang="en-US"/>
           </a:p>
@@ -1972,7 +1972,7 @@
               <a:pPr>
                 <a:defRPr/>
               </a:pPr>
-              <a:t>5/13/2009</a:t>
+              <a:t>2/5/2013</a:t>
             </a:fld>
             <a:endParaRPr lang="en-US"/>
           </a:p>
@@ -2112,7 +2112,7 @@
               <a:pPr>
                 <a:defRPr/>
               </a:pPr>
-              <a:t>5/13/2009</a:t>
+              <a:t>2/5/2013</a:t>
             </a:fld>
             <a:endParaRPr lang="en-US"/>
           </a:p>
@@ -2229,7 +2229,7 @@
               <a:pPr>
                 <a:defRPr/>
               </a:pPr>
-              <a:t>5/13/2009</a:t>
+              <a:t>2/5/2013</a:t>
             </a:fld>
             <a:endParaRPr lang="en-US"/>
           </a:p>
@@ -2528,7 +2528,7 @@
               <a:pPr>
                 <a:defRPr/>
               </a:pPr>
-              <a:t>5/13/2009</a:t>
+              <a:t>2/5/2013</a:t>
             </a:fld>
             <a:endParaRPr lang="en-US"/>
           </a:p>
@@ -2806,7 +2806,7 @@
               <a:pPr>
                 <a:defRPr/>
               </a:pPr>
-              <a:t>5/13/2009</a:t>
+              <a:t>2/5/2013</a:t>
             </a:fld>
             <a:endParaRPr lang="en-US"/>
           </a:p>
@@ -3062,7 +3062,7 @@
               <a:pPr>
                 <a:defRPr/>
               </a:pPr>
-              <a:t>5/13/2009</a:t>
+              <a:t>2/5/2013</a:t>
             </a:fld>
             <a:endParaRPr lang="en-US"/>
           </a:p>
@@ -3640,16 +3640,6 @@
               </a:rPr>
               <a:t>Design Patterns</a:t>
             </a:r>
-            <a:endParaRPr lang="en-US" sz="8800" dirty="0">
-              <a:solidFill>
-                <a:schemeClr val="accent1">
-                  <a:lumMod val="40000"/>
-                  <a:lumOff val="60000"/>
-                </a:schemeClr>
-              </a:solidFill>
-              <a:latin typeface="+mn-lt"/>
-              <a:cs typeface="+mn-cs"/>
-            </a:endParaRPr>
           </a:p>
         </p:txBody>
       </p:sp>
@@ -3849,16 +3839,6 @@
               </a:rPr>
               <a:t>Pattern</a:t>
             </a:r>
-            <a:endParaRPr lang="en-US" sz="6000" dirty="0">
-              <a:solidFill>
-                <a:schemeClr val="accent1">
-                  <a:lumMod val="40000"/>
-                  <a:lumOff val="60000"/>
-                </a:schemeClr>
-              </a:solidFill>
-              <a:latin typeface="+mn-lt"/>
-              <a:cs typeface="+mn-cs"/>
-            </a:endParaRPr>
           </a:p>
         </p:txBody>
       </p:sp>
@@ -4009,16 +3989,6 @@
               </a:rPr>
               <a:t>How to build a duck</a:t>
             </a:r>
-            <a:endParaRPr lang="en-US" sz="6000" dirty="0">
-              <a:solidFill>
-                <a:schemeClr val="accent1">
-                  <a:lumMod val="40000"/>
-                  <a:lumOff val="60000"/>
-                </a:schemeClr>
-              </a:solidFill>
-              <a:latin typeface="+mn-lt"/>
-              <a:cs typeface="+mn-cs"/>
-            </a:endParaRPr>
           </a:p>
         </p:txBody>
       </p:sp>
@@ -4212,16 +4182,6 @@
               </a:rPr>
               <a:t>Factories</a:t>
             </a:r>
-            <a:endParaRPr lang="en-US" sz="6000" dirty="0">
-              <a:solidFill>
-                <a:schemeClr val="accent1">
-                  <a:lumMod val="40000"/>
-                  <a:lumOff val="60000"/>
-                </a:schemeClr>
-              </a:solidFill>
-              <a:latin typeface="+mn-lt"/>
-              <a:cs typeface="+mn-cs"/>
-            </a:endParaRPr>
           </a:p>
         </p:txBody>
       </p:sp>
@@ -4411,16 +4371,6 @@
               </a:rPr>
               <a:t>Pattern</a:t>
             </a:r>
-            <a:endParaRPr lang="en-US" sz="6000" dirty="0">
-              <a:solidFill>
-                <a:schemeClr val="accent1">
-                  <a:lumMod val="40000"/>
-                  <a:lumOff val="60000"/>
-                </a:schemeClr>
-              </a:solidFill>
-              <a:latin typeface="+mn-lt"/>
-              <a:cs typeface="+mn-cs"/>
-            </a:endParaRPr>
           </a:p>
         </p:txBody>
       </p:sp>
@@ -4584,16 +4534,6 @@
               </a:rPr>
               <a:t>Factories</a:t>
             </a:r>
-            <a:endParaRPr lang="en-US" sz="6000" dirty="0">
-              <a:solidFill>
-                <a:schemeClr val="accent1">
-                  <a:lumMod val="40000"/>
-                  <a:lumOff val="60000"/>
-                </a:schemeClr>
-              </a:solidFill>
-              <a:latin typeface="+mn-lt"/>
-              <a:cs typeface="+mn-cs"/>
-            </a:endParaRPr>
           </a:p>
         </p:txBody>
       </p:sp>
@@ -4744,16 +4684,6 @@
               </a:rPr>
               <a:t>About that flock…</a:t>
             </a:r>
-            <a:endParaRPr lang="en-US" sz="6000" dirty="0">
-              <a:solidFill>
-                <a:schemeClr val="accent1">
-                  <a:lumMod val="40000"/>
-                  <a:lumOff val="60000"/>
-                </a:schemeClr>
-              </a:solidFill>
-              <a:latin typeface="+mn-lt"/>
-              <a:cs typeface="+mn-cs"/>
-            </a:endParaRPr>
           </a:p>
         </p:txBody>
       </p:sp>
@@ -4943,16 +4873,6 @@
               </a:rPr>
               <a:t>Pattern</a:t>
             </a:r>
-            <a:endParaRPr lang="en-US" sz="6000" dirty="0">
-              <a:solidFill>
-                <a:schemeClr val="accent1">
-                  <a:lumMod val="40000"/>
-                  <a:lumOff val="60000"/>
-                </a:schemeClr>
-              </a:solidFill>
-              <a:latin typeface="+mn-lt"/>
-              <a:cs typeface="+mn-cs"/>
-            </a:endParaRPr>
           </a:p>
         </p:txBody>
       </p:sp>
@@ -5142,16 +5062,6 @@
               </a:rPr>
               <a:t>Pattern</a:t>
             </a:r>
-            <a:endParaRPr lang="en-US" sz="6000" dirty="0">
-              <a:solidFill>
-                <a:schemeClr val="accent1">
-                  <a:lumMod val="40000"/>
-                  <a:lumOff val="60000"/>
-                </a:schemeClr>
-              </a:solidFill>
-              <a:latin typeface="+mn-lt"/>
-              <a:cs typeface="+mn-cs"/>
-            </a:endParaRPr>
           </a:p>
         </p:txBody>
       </p:sp>
@@ -5283,16 +5193,6 @@
               </a:rPr>
               <a:t>Another way of changing behavior</a:t>
             </a:r>
-            <a:endParaRPr lang="en-US" sz="6000" dirty="0">
-              <a:solidFill>
-                <a:schemeClr val="accent1">
-                  <a:lumMod val="40000"/>
-                  <a:lumOff val="60000"/>
-                </a:schemeClr>
-              </a:solidFill>
-              <a:latin typeface="+mn-lt"/>
-              <a:cs typeface="+mn-cs"/>
-            </a:endParaRPr>
           </a:p>
         </p:txBody>
       </p:sp>
@@ -5580,16 +5480,6 @@
               </a:rPr>
               <a:t>Pattern</a:t>
             </a:r>
-            <a:endParaRPr lang="en-US" sz="6000" dirty="0">
-              <a:solidFill>
-                <a:schemeClr val="accent1">
-                  <a:lumMod val="40000"/>
-                  <a:lumOff val="60000"/>
-                </a:schemeClr>
-              </a:solidFill>
-              <a:latin typeface="+mn-lt"/>
-              <a:cs typeface="+mn-cs"/>
-            </a:endParaRPr>
           </a:p>
         </p:txBody>
       </p:sp>
@@ -5753,16 +5643,6 @@
               </a:rPr>
               <a:t>A Disclaimer</a:t>
             </a:r>
-            <a:endParaRPr lang="en-US" sz="6000" dirty="0">
-              <a:solidFill>
-                <a:schemeClr val="accent1">
-                  <a:lumMod val="40000"/>
-                  <a:lumOff val="60000"/>
-                </a:schemeClr>
-              </a:solidFill>
-              <a:latin typeface="+mn-lt"/>
-              <a:cs typeface="+mn-cs"/>
-            </a:endParaRPr>
           </a:p>
         </p:txBody>
       </p:sp>
@@ -5920,16 +5800,6 @@
               </a:rPr>
               <a:t>Pattern</a:t>
             </a:r>
-            <a:endParaRPr lang="en-US" sz="6000" dirty="0">
-              <a:solidFill>
-                <a:schemeClr val="accent1">
-                  <a:lumMod val="40000"/>
-                  <a:lumOff val="60000"/>
-                </a:schemeClr>
-              </a:solidFill>
-              <a:latin typeface="+mn-lt"/>
-              <a:cs typeface="+mn-cs"/>
-            </a:endParaRPr>
           </a:p>
         </p:txBody>
       </p:sp>
@@ -6080,16 +5950,6 @@
               </a:rPr>
               <a:t>Managing the Barn</a:t>
             </a:r>
-            <a:endParaRPr lang="en-US" sz="6000" dirty="0">
-              <a:solidFill>
-                <a:schemeClr val="accent1">
-                  <a:lumMod val="40000"/>
-                  <a:lumOff val="60000"/>
-                </a:schemeClr>
-              </a:solidFill>
-              <a:latin typeface="+mn-lt"/>
-              <a:cs typeface="+mn-cs"/>
-            </a:endParaRPr>
           </a:p>
         </p:txBody>
       </p:sp>
@@ -6376,16 +6236,6 @@
               </a:rPr>
               <a:t>Pattern</a:t>
             </a:r>
-            <a:endParaRPr lang="en-US" sz="6000" dirty="0">
-              <a:solidFill>
-                <a:schemeClr val="accent1">
-                  <a:lumMod val="40000"/>
-                  <a:lumOff val="60000"/>
-                </a:schemeClr>
-              </a:solidFill>
-              <a:latin typeface="+mn-lt"/>
-              <a:cs typeface="+mn-cs"/>
-            </a:endParaRPr>
           </a:p>
         </p:txBody>
       </p:sp>
@@ -6597,16 +6447,6 @@
               </a:rPr>
               <a:t>Pattern</a:t>
             </a:r>
-            <a:endParaRPr lang="en-US" sz="6000" dirty="0">
-              <a:solidFill>
-                <a:schemeClr val="accent1">
-                  <a:lumMod val="40000"/>
-                  <a:lumOff val="60000"/>
-                </a:schemeClr>
-              </a:solidFill>
-              <a:latin typeface="+mn-lt"/>
-              <a:cs typeface="+mn-cs"/>
-            </a:endParaRPr>
           </a:p>
         </p:txBody>
       </p:sp>
@@ -6783,16 +6623,6 @@
               </a:rPr>
               <a:t>Pattern</a:t>
             </a:r>
-            <a:endParaRPr lang="en-US" sz="6000" dirty="0">
-              <a:solidFill>
-                <a:schemeClr val="accent1">
-                  <a:lumMod val="40000"/>
-                  <a:lumOff val="60000"/>
-                </a:schemeClr>
-              </a:solidFill>
-              <a:latin typeface="+mn-lt"/>
-              <a:cs typeface="+mn-cs"/>
-            </a:endParaRPr>
           </a:p>
         </p:txBody>
       </p:sp>
@@ -6982,16 +6812,6 @@
               </a:rPr>
               <a:t>Pattern</a:t>
             </a:r>
-            <a:endParaRPr lang="en-US" sz="6000" dirty="0">
-              <a:solidFill>
-                <a:schemeClr val="accent1">
-                  <a:lumMod val="40000"/>
-                  <a:lumOff val="60000"/>
-                </a:schemeClr>
-              </a:solidFill>
-              <a:latin typeface="+mn-lt"/>
-              <a:cs typeface="+mn-cs"/>
-            </a:endParaRPr>
           </a:p>
         </p:txBody>
       </p:sp>
@@ -7043,7 +6863,6 @@
               <a:rPr lang="en-US" dirty="0"/>
               <a:t>Sub-Interface 1</a:t>
             </a:r>
-            <a:endParaRPr lang="en-US" dirty="0"/>
           </a:p>
         </p:txBody>
       </p:sp>
@@ -7095,7 +6914,6 @@
               <a:rPr lang="en-US" dirty="0"/>
               <a:t>Sub-Interface 2</a:t>
             </a:r>
-            <a:endParaRPr lang="en-US" dirty="0"/>
           </a:p>
         </p:txBody>
       </p:sp>
@@ -7147,7 +6965,6 @@
               <a:rPr lang="en-US" dirty="0"/>
               <a:t>Sub-Interface 3</a:t>
             </a:r>
-            <a:endParaRPr lang="en-US" dirty="0"/>
           </a:p>
         </p:txBody>
       </p:sp>
@@ -7199,7 +7016,6 @@
               <a:rPr lang="en-US" dirty="0"/>
               <a:t>High-Level Interface</a:t>
             </a:r>
-            <a:endParaRPr lang="en-US" dirty="0"/>
           </a:p>
         </p:txBody>
       </p:sp>
@@ -7251,7 +7067,6 @@
               <a:rPr lang="en-US" dirty="0"/>
               <a:t>Consumer </a:t>
             </a:r>
-            <a:endParaRPr lang="en-US" dirty="0"/>
           </a:p>
         </p:txBody>
       </p:sp>
@@ -7479,16 +7294,6 @@
               </a:rPr>
               <a:t>Types of Facades</a:t>
             </a:r>
-            <a:endParaRPr lang="en-US" sz="6000" dirty="0">
-              <a:solidFill>
-                <a:schemeClr val="accent1">
-                  <a:lumMod val="40000"/>
-                  <a:lumOff val="60000"/>
-                </a:schemeClr>
-              </a:solidFill>
-              <a:latin typeface="+mn-lt"/>
-              <a:cs typeface="+mn-cs"/>
-            </a:endParaRPr>
           </a:p>
         </p:txBody>
       </p:sp>
@@ -7642,16 +7447,6 @@
               </a:rPr>
               <a:t>Changing of the Guard</a:t>
             </a:r>
-            <a:endParaRPr lang="en-US" sz="6000" dirty="0">
-              <a:solidFill>
-                <a:schemeClr val="accent1">
-                  <a:lumMod val="40000"/>
-                  <a:lumOff val="60000"/>
-                </a:schemeClr>
-              </a:solidFill>
-              <a:latin typeface="+mn-lt"/>
-              <a:cs typeface="+mn-cs"/>
-            </a:endParaRPr>
           </a:p>
         </p:txBody>
       </p:sp>
@@ -8076,16 +7871,6 @@
               </a:rPr>
               <a:t>Observer Pattern</a:t>
             </a:r>
-            <a:endParaRPr lang="en-US" sz="6000" dirty="0">
-              <a:solidFill>
-                <a:schemeClr val="accent1">
-                  <a:lumMod val="40000"/>
-                  <a:lumOff val="60000"/>
-                </a:schemeClr>
-              </a:solidFill>
-              <a:latin typeface="+mn-lt"/>
-              <a:cs typeface="+mn-cs"/>
-            </a:endParaRPr>
           </a:p>
         </p:txBody>
       </p:sp>
@@ -8249,16 +8034,6 @@
               </a:rPr>
               <a:t>Observer Pattern</a:t>
             </a:r>
-            <a:endParaRPr lang="en-US" sz="6000" dirty="0">
-              <a:solidFill>
-                <a:schemeClr val="accent1">
-                  <a:lumMod val="40000"/>
-                  <a:lumOff val="60000"/>
-                </a:schemeClr>
-              </a:solidFill>
-              <a:latin typeface="+mn-lt"/>
-              <a:cs typeface="+mn-cs"/>
-            </a:endParaRPr>
           </a:p>
         </p:txBody>
       </p:sp>
@@ -8409,16 +8184,6 @@
               </a:rPr>
               <a:t>Ducks!</a:t>
             </a:r>
-            <a:endParaRPr lang="en-US" sz="8800" dirty="0">
-              <a:solidFill>
-                <a:schemeClr val="accent1">
-                  <a:lumMod val="40000"/>
-                  <a:lumOff val="60000"/>
-                </a:schemeClr>
-              </a:solidFill>
-              <a:latin typeface="+mn-lt"/>
-              <a:cs typeface="+mn-cs"/>
-            </a:endParaRPr>
           </a:p>
         </p:txBody>
       </p:sp>
@@ -8540,16 +8305,6 @@
               </a:rPr>
               <a:t>Bringing Order to Chaos</a:t>
             </a:r>
-            <a:endParaRPr lang="en-US" sz="6000" dirty="0">
-              <a:solidFill>
-                <a:schemeClr val="accent1">
-                  <a:lumMod val="40000"/>
-                  <a:lumOff val="60000"/>
-                </a:schemeClr>
-              </a:solidFill>
-              <a:latin typeface="+mn-lt"/>
-              <a:cs typeface="+mn-cs"/>
-            </a:endParaRPr>
           </a:p>
         </p:txBody>
       </p:sp>
@@ -8713,16 +8468,6 @@
               </a:rPr>
               <a:t>Strategy Pattern</a:t>
             </a:r>
-            <a:endParaRPr lang="en-US" sz="6000" dirty="0">
-              <a:solidFill>
-                <a:schemeClr val="accent1">
-                  <a:lumMod val="40000"/>
-                  <a:lumOff val="60000"/>
-                </a:schemeClr>
-              </a:solidFill>
-              <a:latin typeface="+mn-lt"/>
-              <a:cs typeface="+mn-cs"/>
-            </a:endParaRPr>
           </a:p>
         </p:txBody>
       </p:sp>
@@ -8886,16 +8631,6 @@
               </a:rPr>
               <a:t>Strategy Pattern</a:t>
             </a:r>
-            <a:endParaRPr lang="en-US" sz="6000" dirty="0">
-              <a:solidFill>
-                <a:schemeClr val="accent1">
-                  <a:lumMod val="40000"/>
-                  <a:lumOff val="60000"/>
-                </a:schemeClr>
-              </a:solidFill>
-              <a:latin typeface="+mn-lt"/>
-              <a:cs typeface="+mn-cs"/>
-            </a:endParaRPr>
           </a:p>
         </p:txBody>
       </p:sp>
@@ -9046,16 +8781,6 @@
               </a:rPr>
               <a:t>Logging</a:t>
             </a:r>
-            <a:endParaRPr lang="en-US" sz="6000" dirty="0">
-              <a:solidFill>
-                <a:schemeClr val="accent1">
-                  <a:lumMod val="40000"/>
-                  <a:lumOff val="60000"/>
-                </a:schemeClr>
-              </a:solidFill>
-              <a:latin typeface="+mn-lt"/>
-              <a:cs typeface="+mn-cs"/>
-            </a:endParaRPr>
           </a:p>
         </p:txBody>
       </p:sp>
@@ -9316,16 +9041,6 @@
               </a:rPr>
               <a:t>Static Gateway Pattern</a:t>
             </a:r>
-            <a:endParaRPr lang="en-US" sz="6000" dirty="0">
-              <a:solidFill>
-                <a:schemeClr val="accent1">
-                  <a:lumMod val="40000"/>
-                  <a:lumOff val="60000"/>
-                </a:schemeClr>
-              </a:solidFill>
-              <a:latin typeface="+mn-lt"/>
-              <a:cs typeface="+mn-cs"/>
-            </a:endParaRPr>
           </a:p>
         </p:txBody>
       </p:sp>
@@ -9550,16 +9265,6 @@
               </a:rPr>
               <a:t>Static Gateway Pattern</a:t>
             </a:r>
-            <a:endParaRPr lang="en-US" sz="6000" dirty="0">
-              <a:solidFill>
-                <a:schemeClr val="accent1">
-                  <a:lumMod val="40000"/>
-                  <a:lumOff val="60000"/>
-                </a:schemeClr>
-              </a:solidFill>
-              <a:latin typeface="+mn-lt"/>
-              <a:cs typeface="+mn-cs"/>
-            </a:endParaRPr>
           </a:p>
         </p:txBody>
       </p:sp>
@@ -9710,16 +9415,6 @@
               </a:rPr>
               <a:t>Buy this book!</a:t>
             </a:r>
-            <a:endParaRPr lang="en-US" sz="6000" dirty="0">
-              <a:solidFill>
-                <a:schemeClr val="accent1">
-                  <a:lumMod val="40000"/>
-                  <a:lumOff val="60000"/>
-                </a:schemeClr>
-              </a:solidFill>
-              <a:latin typeface="+mn-lt"/>
-              <a:cs typeface="+mn-cs"/>
-            </a:endParaRPr>
           </a:p>
         </p:txBody>
       </p:sp>
@@ -9841,6 +9536,126 @@
               </a:rPr>
               <a:t>Me:</a:t>
             </a:r>
+          </a:p>
+        </p:txBody>
+      </p:sp>
+      <p:sp>
+        <p:nvSpPr>
+          <p:cNvPr id="50179" name="TextBox 3"/>
+          <p:cNvSpPr txBox="1">
+            <a:spLocks noChangeArrowheads="1"/>
+          </p:cNvSpPr>
+          <p:nvPr/>
+        </p:nvSpPr>
+        <p:spPr bwMode="auto">
+          <a:xfrm>
+            <a:off x="685800" y="2133600"/>
+            <a:ext cx="7315200" cy="1384300"/>
+          </a:xfrm>
+          <a:prstGeom prst="rect">
+            <a:avLst/>
+          </a:prstGeom>
+          <a:noFill/>
+          <a:ln w="9525">
+            <a:noFill/>
+            <a:miter lim="800000"/>
+            <a:headEnd/>
+            <a:tailEnd/>
+          </a:ln>
+        </p:spPr>
+        <p:txBody>
+          <a:bodyPr>
+            <a:spAutoFit/>
+          </a:bodyPr>
+          <a:lstStyle/>
+          <a:p>
+            <a:r>
+              <a:rPr lang="en-US" sz="2800" dirty="0">
+                <a:solidFill>
+                  <a:schemeClr val="bg1"/>
+                </a:solidFill>
+                <a:latin typeface="Calibri" pitchFamily="34" charset="0"/>
+              </a:rPr>
+              <a:t>cerikpete@gmail.com</a:t>
+            </a:r>
+          </a:p>
+          <a:p>
+            <a:endParaRPr lang="en-US" sz="2800" dirty="0">
+              <a:latin typeface="Calibri" pitchFamily="34" charset="0"/>
+            </a:endParaRPr>
+          </a:p>
+          <a:p>
+            <a:r>
+              <a:rPr lang="en-US" sz="2800" dirty="0">
+                <a:solidFill>
+                  <a:schemeClr val="bg1"/>
+                </a:solidFill>
+                <a:latin typeface="Calibri" pitchFamily="34" charset="0"/>
+              </a:rPr>
+              <a:t>http://</a:t>
+            </a:r>
+            <a:r>
+              <a:rPr lang="en-US" sz="2800" dirty="0" smtClean="0">
+                <a:solidFill>
+                  <a:schemeClr val="bg1"/>
+                </a:solidFill>
+                <a:latin typeface="Calibri" pitchFamily="34" charset="0"/>
+              </a:rPr>
+              <a:t>erikbase.wordpress.com</a:t>
+            </a:r>
+            <a:endParaRPr lang="en-US" sz="2800" dirty="0">
+              <a:solidFill>
+                <a:schemeClr val="bg1"/>
+              </a:solidFill>
+              <a:latin typeface="Calibri" pitchFamily="34" charset="0"/>
+            </a:endParaRPr>
+          </a:p>
+        </p:txBody>
+      </p:sp>
+      <p:sp>
+        <p:nvSpPr>
+          <p:cNvPr id="4" name="TextBox 3"/>
+          <p:cNvSpPr txBox="1"/>
+          <p:nvPr/>
+        </p:nvSpPr>
+        <p:spPr>
+          <a:xfrm>
+            <a:off x="304800" y="3784600"/>
+            <a:ext cx="8229600" cy="1016000"/>
+          </a:xfrm>
+          <a:prstGeom prst="rect">
+            <a:avLst/>
+          </a:prstGeom>
+          <a:noFill/>
+        </p:spPr>
+        <p:txBody>
+          <a:bodyPr>
+            <a:spAutoFit/>
+          </a:bodyPr>
+          <a:lstStyle/>
+          <a:p>
+            <a:pPr fontAlgn="auto">
+              <a:spcBef>
+                <a:spcPts val="0"/>
+              </a:spcBef>
+              <a:spcAft>
+                <a:spcPts val="0"/>
+              </a:spcAft>
+              <a:defRPr/>
+            </a:pPr>
+            <a:r>
+              <a:rPr lang="en-US" sz="6000" dirty="0" smtClean="0">
+                <a:solidFill>
+                  <a:schemeClr val="accent1">
+                    <a:lumMod val="40000"/>
+                    <a:lumOff val="60000"/>
+                  </a:schemeClr>
+                </a:solidFill>
+                <a:latin typeface="+mn-lt"/>
+                <a:cs typeface="+mn-cs"/>
+              </a:rPr>
+              <a:t>Repository:</a:t>
+            </a:r>
             <a:endParaRPr lang="en-US" sz="6000" dirty="0">
               <a:solidFill>
                 <a:schemeClr val="accent1">
@@ -9856,7 +9671,7 @@
       </p:sp>
       <p:sp>
         <p:nvSpPr>
-          <p:cNvPr id="50179" name="TextBox 3"/>
+          <p:cNvPr id="7" name="TextBox 3"/>
           <p:cNvSpPr txBox="1">
             <a:spLocks noChangeArrowheads="1"/>
           </p:cNvSpPr>
@@ -9864,8 +9679,8 @@
         </p:nvSpPr>
         <p:spPr bwMode="auto">
           <a:xfrm>
-            <a:off x="609600" y="2133600"/>
-            <a:ext cx="7315200" cy="1384300"/>
+            <a:off x="685800" y="5191780"/>
+            <a:ext cx="7315200" cy="523220"/>
           </a:xfrm>
           <a:prstGeom prst="rect">
             <a:avLst/>
@@ -9885,30 +9700,20 @@
           <a:lstStyle/>
           <a:p>
             <a:r>
-              <a:rPr lang="en-US" sz="2800">
+              <a:rPr lang="en-US" sz="2800" dirty="0">
                 <a:solidFill>
                   <a:schemeClr val="bg1"/>
                 </a:solidFill>
                 <a:latin typeface="Calibri" pitchFamily="34" charset="0"/>
               </a:rPr>
-              <a:t>cerikpete@gmail.com</a:t>
-            </a:r>
-          </a:p>
-          <a:p>
-            <a:endParaRPr lang="en-US" sz="2800">
+              <a:t>git://github.com/cerikpete/designpatterns.git</a:t>
+            </a:r>
+            <a:endParaRPr lang="en-US" sz="2800" dirty="0">
+              <a:solidFill>
+                <a:schemeClr val="bg1"/>
+              </a:solidFill>
               <a:latin typeface="Calibri" pitchFamily="34" charset="0"/>
             </a:endParaRPr>
-          </a:p>
-          <a:p>
-            <a:r>
-              <a:rPr lang="en-US" sz="2800">
-                <a:solidFill>
-                  <a:schemeClr val="bg1"/>
-                </a:solidFill>
-                <a:latin typeface="Calibri" pitchFamily="34" charset="0"/>
-              </a:rPr>
-              <a:t>http://erikbase.blogspot.com</a:t>
-            </a:r>
           </a:p>
         </p:txBody>
       </p:sp>
@@ -9998,16 +9803,6 @@
               </a:rPr>
               <a:t>Interfaces</a:t>
             </a:r>
-            <a:endParaRPr lang="en-US" sz="6000" dirty="0">
-              <a:solidFill>
-                <a:schemeClr val="accent1">
-                  <a:lumMod val="40000"/>
-                  <a:lumOff val="60000"/>
-                </a:schemeClr>
-              </a:solidFill>
-              <a:latin typeface="+mn-lt"/>
-              <a:cs typeface="+mn-cs"/>
-            </a:endParaRPr>
           </a:p>
         </p:txBody>
       </p:sp>
@@ -10300,16 +10095,6 @@
               </a:rPr>
               <a:t>What about other birds?</a:t>
             </a:r>
-            <a:endParaRPr lang="en-US" sz="6000" dirty="0">
-              <a:solidFill>
-                <a:schemeClr val="accent1">
-                  <a:lumMod val="40000"/>
-                  <a:lumOff val="60000"/>
-                </a:schemeClr>
-              </a:solidFill>
-              <a:latin typeface="+mn-lt"/>
-              <a:cs typeface="+mn-cs"/>
-            </a:endParaRPr>
           </a:p>
         </p:txBody>
       </p:sp>
@@ -10546,16 +10331,6 @@
               </a:rPr>
               <a:t>Adapter Pattern</a:t>
             </a:r>
-            <a:endParaRPr lang="en-US" sz="6000" dirty="0">
-              <a:solidFill>
-                <a:schemeClr val="accent1">
-                  <a:lumMod val="40000"/>
-                  <a:lumOff val="60000"/>
-                </a:schemeClr>
-              </a:solidFill>
-              <a:latin typeface="+mn-lt"/>
-              <a:cs typeface="+mn-cs"/>
-            </a:endParaRPr>
           </a:p>
         </p:txBody>
       </p:sp>
@@ -10719,16 +10494,6 @@
               </a:rPr>
               <a:t>Adapter Pattern</a:t>
             </a:r>
-            <a:endParaRPr lang="en-US" sz="6000" dirty="0">
-              <a:solidFill>
-                <a:schemeClr val="accent1">
-                  <a:lumMod val="40000"/>
-                  <a:lumOff val="60000"/>
-                </a:schemeClr>
-              </a:solidFill>
-              <a:latin typeface="+mn-lt"/>
-              <a:cs typeface="+mn-cs"/>
-            </a:endParaRPr>
           </a:p>
         </p:txBody>
       </p:sp>
@@ -10879,16 +10644,6 @@
               </a:rPr>
               <a:t>What the flock?</a:t>
             </a:r>
-            <a:endParaRPr lang="en-US" sz="6000" dirty="0">
-              <a:solidFill>
-                <a:schemeClr val="accent1">
-                  <a:lumMod val="40000"/>
-                  <a:lumOff val="60000"/>
-                </a:schemeClr>
-              </a:solidFill>
-              <a:latin typeface="+mn-lt"/>
-              <a:cs typeface="+mn-cs"/>
-            </a:endParaRPr>
           </a:p>
         </p:txBody>
       </p:sp>
@@ -11078,16 +10833,6 @@
               </a:rPr>
               <a:t>Pattern</a:t>
             </a:r>
-            <a:endParaRPr lang="en-US" sz="6000" dirty="0">
-              <a:solidFill>
-                <a:schemeClr val="accent1">
-                  <a:lumMod val="40000"/>
-                  <a:lumOff val="60000"/>
-                </a:schemeClr>
-              </a:solidFill>
-              <a:latin typeface="+mn-lt"/>
-              <a:cs typeface="+mn-cs"/>
-            </a:endParaRPr>
           </a:p>
         </p:txBody>
       </p:sp>

</xml_diff>